<commit_message>
add reference in Lab08.pptx
</commit_message>
<xml_diff>
--- a/week08/Lab08.pptx
+++ b/week08/Lab08.pptx
@@ -38,7 +38,8 @@
     <p:sldId id="1062" r:id="rId31"/>
     <p:sldId id="1063" r:id="rId32"/>
     <p:sldId id="1064" r:id="rId33"/>
-    <p:sldId id="1065" r:id="rId34"/>
+    <p:sldId id="1066" r:id="rId34"/>
+    <p:sldId id="1065" r:id="rId35"/>
   </p:sldIdLst>
   <p:sldSz cx="12192000" cy="6858000"/>
   <p:notesSz cx="6858000" cy="9144000"/>
@@ -8551,6 +8552,105 @@
 </file>
 
 <file path=ppt/slides/slide31.xml><?xml version="1.0" encoding="utf-8"?>
+<p:sld xmlns:a="http://schemas.openxmlformats.org/drawingml/2006/main" xmlns:r="http://schemas.openxmlformats.org/officeDocument/2006/relationships" xmlns:p="http://schemas.openxmlformats.org/presentationml/2006/main">
+  <p:cSld>
+    <p:spTree>
+      <p:nvGrpSpPr>
+        <p:cNvPr id="1" name=""/>
+        <p:cNvGrpSpPr/>
+        <p:nvPr/>
+      </p:nvGrpSpPr>
+      <p:grpSpPr/>
+      <p:sp>
+        <p:nvSpPr>
+          <p:cNvPr id="2" name="标题 1"/>
+          <p:cNvSpPr>
+            <a:spLocks noGrp="1"/>
+          </p:cNvSpPr>
+          <p:nvPr>
+            <p:ph type="title"/>
+          </p:nvPr>
+        </p:nvSpPr>
+        <p:spPr/>
+        <p:txBody>
+          <a:bodyPr/>
+          <a:p>
+            <a:r>
+              <a:rPr lang="en-US" altLang="zh-CN"/>
+              <a:t>Reference</a:t>
+            </a:r>
+            <a:endParaRPr lang="en-US" altLang="zh-CN"/>
+          </a:p>
+        </p:txBody>
+      </p:sp>
+      <p:sp>
+        <p:nvSpPr>
+          <p:cNvPr id="3" name="内容占位符 2"/>
+          <p:cNvSpPr>
+            <a:spLocks noGrp="1"/>
+          </p:cNvSpPr>
+          <p:nvPr>
+            <p:ph idx="1"/>
+          </p:nvPr>
+        </p:nvSpPr>
+        <p:spPr/>
+        <p:txBody>
+          <a:bodyPr/>
+          <a:p>
+            <a:r>
+              <a:rPr lang="en-US" altLang="zh-CN"/>
+              <a:t>Some useful introductions of SSE:</a:t>
+            </a:r>
+            <a:endParaRPr lang="en-US" altLang="zh-CN"/>
+          </a:p>
+          <a:p>
+            <a:pPr marL="0" indent="0">
+              <a:buNone/>
+            </a:pPr>
+            <a:r>
+              <a:rPr lang="en-US" altLang="zh-CN"/>
+              <a:t>   https://gist.github.com/detomon/fb9db687b154d67dbb50</a:t>
+            </a:r>
+            <a:endParaRPr lang="en-US" altLang="zh-CN"/>
+          </a:p>
+          <a:p>
+            <a:pPr>
+              <a:buFont typeface="Arial" panose="020B0604020202020204" pitchFamily="34" charset="0"/>
+              <a:buChar char="•"/>
+            </a:pPr>
+            <a:r>
+              <a:rPr lang="en-US" altLang="zh-CN"/>
+              <a:t>Neon documentation:</a:t>
+            </a:r>
+            <a:endParaRPr lang="en-US" altLang="zh-CN"/>
+          </a:p>
+          <a:p>
+            <a:pPr marL="0" indent="0">
+              <a:buNone/>
+            </a:pPr>
+            <a:r>
+              <a:rPr lang="en-US" altLang="zh-CN"/>
+              <a:t>  https://developer.arm.com/architectures/instruction-sets/intrinsics</a:t>
+            </a:r>
+            <a:endParaRPr lang="en-US" altLang="zh-CN"/>
+          </a:p>
+          <a:p>
+            <a:endParaRPr lang="en-US" altLang="zh-CN"/>
+          </a:p>
+          <a:p>
+            <a:endParaRPr lang="en-US" altLang="zh-CN"/>
+          </a:p>
+        </p:txBody>
+      </p:sp>
+    </p:spTree>
+  </p:cSld>
+  <p:clrMapOvr>
+    <a:masterClrMapping/>
+  </p:clrMapOvr>
+</p:sld>
+</file>
+
+<file path=ppt/slides/slide32.xml><?xml version="1.0" encoding="utf-8"?>
 <p:sld xmlns:a="http://schemas.openxmlformats.org/drawingml/2006/main" xmlns:r="http://schemas.openxmlformats.org/officeDocument/2006/relationships" xmlns:p="http://schemas.openxmlformats.org/presentationml/2006/main">
   <p:cSld>
     <p:spTree>

</xml_diff>